<commit_message>
update image for method
</commit_message>
<xml_diff>
--- a/03_Figures/08_Development/UpdateSelection.pptx
+++ b/03_Figures/08_Development/UpdateSelection.pptx
@@ -104,6 +104,11 @@
       </a:defRPr>
     </a:lvl9pPr>
   </p:defaultTextStyle>
+  <p:extLst>
+    <p:ext uri="{EFAFB233-063F-42B5-8137-9DF3F51BA10A}">
+      <p15:sldGuideLst xmlns:p15="http://schemas.microsoft.com/office/powerpoint/2012/main"/>
+    </p:ext>
+  </p:extLst>
 </p:presentation>
 </file>
 
@@ -238,7 +243,7 @@
           <a:p>
             <a:fld id="{0DF3B079-B95B-4CF8-A217-617FE502D280}" type="datetimeFigureOut">
               <a:rPr lang="de-CH" smtClean="0"/>
-              <a:t>23.01.2017</a:t>
+              <a:t>31.01.2017</a:t>
             </a:fld>
             <a:endParaRPr lang="de-CH"/>
           </a:p>
@@ -408,7 +413,7 @@
           <a:p>
             <a:fld id="{0DF3B079-B95B-4CF8-A217-617FE502D280}" type="datetimeFigureOut">
               <a:rPr lang="de-CH" smtClean="0"/>
-              <a:t>23.01.2017</a:t>
+              <a:t>31.01.2017</a:t>
             </a:fld>
             <a:endParaRPr lang="de-CH"/>
           </a:p>
@@ -588,7 +593,7 @@
           <a:p>
             <a:fld id="{0DF3B079-B95B-4CF8-A217-617FE502D280}" type="datetimeFigureOut">
               <a:rPr lang="de-CH" smtClean="0"/>
-              <a:t>23.01.2017</a:t>
+              <a:t>31.01.2017</a:t>
             </a:fld>
             <a:endParaRPr lang="de-CH"/>
           </a:p>
@@ -758,7 +763,7 @@
           <a:p>
             <a:fld id="{0DF3B079-B95B-4CF8-A217-617FE502D280}" type="datetimeFigureOut">
               <a:rPr lang="de-CH" smtClean="0"/>
-              <a:t>23.01.2017</a:t>
+              <a:t>31.01.2017</a:t>
             </a:fld>
             <a:endParaRPr lang="de-CH"/>
           </a:p>
@@ -1004,7 +1009,7 @@
           <a:p>
             <a:fld id="{0DF3B079-B95B-4CF8-A217-617FE502D280}" type="datetimeFigureOut">
               <a:rPr lang="de-CH" smtClean="0"/>
-              <a:t>23.01.2017</a:t>
+              <a:t>31.01.2017</a:t>
             </a:fld>
             <a:endParaRPr lang="de-CH"/>
           </a:p>
@@ -1236,7 +1241,7 @@
           <a:p>
             <a:fld id="{0DF3B079-B95B-4CF8-A217-617FE502D280}" type="datetimeFigureOut">
               <a:rPr lang="de-CH" smtClean="0"/>
-              <a:t>23.01.2017</a:t>
+              <a:t>31.01.2017</a:t>
             </a:fld>
             <a:endParaRPr lang="de-CH"/>
           </a:p>
@@ -1603,7 +1608,7 @@
           <a:p>
             <a:fld id="{0DF3B079-B95B-4CF8-A217-617FE502D280}" type="datetimeFigureOut">
               <a:rPr lang="de-CH" smtClean="0"/>
-              <a:t>23.01.2017</a:t>
+              <a:t>31.01.2017</a:t>
             </a:fld>
             <a:endParaRPr lang="de-CH"/>
           </a:p>
@@ -1721,7 +1726,7 @@
           <a:p>
             <a:fld id="{0DF3B079-B95B-4CF8-A217-617FE502D280}" type="datetimeFigureOut">
               <a:rPr lang="de-CH" smtClean="0"/>
-              <a:t>23.01.2017</a:t>
+              <a:t>31.01.2017</a:t>
             </a:fld>
             <a:endParaRPr lang="de-CH"/>
           </a:p>
@@ -1816,7 +1821,7 @@
           <a:p>
             <a:fld id="{0DF3B079-B95B-4CF8-A217-617FE502D280}" type="datetimeFigureOut">
               <a:rPr lang="de-CH" smtClean="0"/>
-              <a:t>23.01.2017</a:t>
+              <a:t>31.01.2017</a:t>
             </a:fld>
             <a:endParaRPr lang="de-CH"/>
           </a:p>
@@ -2093,7 +2098,7 @@
           <a:p>
             <a:fld id="{0DF3B079-B95B-4CF8-A217-617FE502D280}" type="datetimeFigureOut">
               <a:rPr lang="de-CH" smtClean="0"/>
-              <a:t>23.01.2017</a:t>
+              <a:t>31.01.2017</a:t>
             </a:fld>
             <a:endParaRPr lang="de-CH"/>
           </a:p>
@@ -2346,7 +2351,7 @@
           <a:p>
             <a:fld id="{0DF3B079-B95B-4CF8-A217-617FE502D280}" type="datetimeFigureOut">
               <a:rPr lang="de-CH" smtClean="0"/>
-              <a:t>23.01.2017</a:t>
+              <a:t>31.01.2017</a:t>
             </a:fld>
             <a:endParaRPr lang="de-CH"/>
           </a:p>
@@ -2559,7 +2564,7 @@
           <a:p>
             <a:fld id="{0DF3B079-B95B-4CF8-A217-617FE502D280}" type="datetimeFigureOut">
               <a:rPr lang="de-CH" smtClean="0"/>
-              <a:t>23.01.2017</a:t>
+              <a:t>31.01.2017</a:t>
             </a:fld>
             <a:endParaRPr lang="de-CH"/>
           </a:p>
@@ -4563,6 +4568,446 @@
           </a:p>
         </p:txBody>
       </p:sp>
+      <p:sp>
+        <p:nvSpPr>
+          <p:cNvPr id="2" name="Oval 1"/>
+          <p:cNvSpPr/>
+          <p:nvPr/>
+        </p:nvSpPr>
+        <p:spPr>
+          <a:xfrm>
+            <a:off x="2994720" y="1421142"/>
+            <a:ext cx="203200" cy="203200"/>
+          </a:xfrm>
+          <a:prstGeom prst="ellipse">
+            <a:avLst/>
+          </a:prstGeom>
+          <a:solidFill>
+            <a:srgbClr val="FFC000"/>
+          </a:solidFill>
+        </p:spPr>
+        <p:style>
+          <a:lnRef idx="2">
+            <a:schemeClr val="accent1">
+              <a:shade val="50000"/>
+            </a:schemeClr>
+          </a:lnRef>
+          <a:fillRef idx="1">
+            <a:schemeClr val="accent1"/>
+          </a:fillRef>
+          <a:effectRef idx="0">
+            <a:schemeClr val="accent1"/>
+          </a:effectRef>
+          <a:fontRef idx="minor">
+            <a:schemeClr val="lt1"/>
+          </a:fontRef>
+        </p:style>
+        <p:txBody>
+          <a:bodyPr rtlCol="0" anchor="ctr"/>
+          <a:lstStyle/>
+          <a:p>
+            <a:pPr algn="ctr"/>
+            <a:r>
+              <a:rPr lang="en-GB" dirty="0" smtClean="0">
+                <a:solidFill>
+                  <a:sysClr val="windowText" lastClr="000000"/>
+                </a:solidFill>
+              </a:rPr>
+              <a:t>1</a:t>
+            </a:r>
+            <a:endParaRPr lang="de-CH" dirty="0">
+              <a:solidFill>
+                <a:sysClr val="windowText" lastClr="000000"/>
+              </a:solidFill>
+            </a:endParaRPr>
+          </a:p>
+        </p:txBody>
+      </p:sp>
+      <p:sp>
+        <p:nvSpPr>
+          <p:cNvPr id="31" name="Oval 30"/>
+          <p:cNvSpPr/>
+          <p:nvPr/>
+        </p:nvSpPr>
+        <p:spPr>
+          <a:xfrm>
+            <a:off x="5462081" y="1910128"/>
+            <a:ext cx="203200" cy="203200"/>
+          </a:xfrm>
+          <a:prstGeom prst="ellipse">
+            <a:avLst/>
+          </a:prstGeom>
+          <a:solidFill>
+            <a:srgbClr val="FFC000"/>
+          </a:solidFill>
+        </p:spPr>
+        <p:style>
+          <a:lnRef idx="2">
+            <a:schemeClr val="accent1">
+              <a:shade val="50000"/>
+            </a:schemeClr>
+          </a:lnRef>
+          <a:fillRef idx="1">
+            <a:schemeClr val="accent1"/>
+          </a:fillRef>
+          <a:effectRef idx="0">
+            <a:schemeClr val="accent1"/>
+          </a:effectRef>
+          <a:fontRef idx="minor">
+            <a:schemeClr val="lt1"/>
+          </a:fontRef>
+        </p:style>
+        <p:txBody>
+          <a:bodyPr rtlCol="0" anchor="ctr"/>
+          <a:lstStyle/>
+          <a:p>
+            <a:pPr algn="ctr"/>
+            <a:r>
+              <a:rPr lang="en-GB" dirty="0">
+                <a:solidFill>
+                  <a:sysClr val="windowText" lastClr="000000"/>
+                </a:solidFill>
+              </a:rPr>
+              <a:t>2</a:t>
+            </a:r>
+            <a:endParaRPr lang="de-CH" dirty="0">
+              <a:solidFill>
+                <a:sysClr val="windowText" lastClr="000000"/>
+              </a:solidFill>
+            </a:endParaRPr>
+          </a:p>
+        </p:txBody>
+      </p:sp>
+      <p:sp>
+        <p:nvSpPr>
+          <p:cNvPr id="32" name="Oval 31"/>
+          <p:cNvSpPr/>
+          <p:nvPr/>
+        </p:nvSpPr>
+        <p:spPr>
+          <a:xfrm>
+            <a:off x="5462081" y="2276289"/>
+            <a:ext cx="203200" cy="203200"/>
+          </a:xfrm>
+          <a:prstGeom prst="ellipse">
+            <a:avLst/>
+          </a:prstGeom>
+          <a:solidFill>
+            <a:srgbClr val="FFC000"/>
+          </a:solidFill>
+        </p:spPr>
+        <p:style>
+          <a:lnRef idx="2">
+            <a:schemeClr val="accent1">
+              <a:shade val="50000"/>
+            </a:schemeClr>
+          </a:lnRef>
+          <a:fillRef idx="1">
+            <a:schemeClr val="accent1"/>
+          </a:fillRef>
+          <a:effectRef idx="0">
+            <a:schemeClr val="accent1"/>
+          </a:effectRef>
+          <a:fontRef idx="minor">
+            <a:schemeClr val="lt1"/>
+          </a:fontRef>
+        </p:style>
+        <p:txBody>
+          <a:bodyPr rtlCol="0" anchor="ctr"/>
+          <a:lstStyle/>
+          <a:p>
+            <a:pPr algn="ctr"/>
+            <a:r>
+              <a:rPr lang="en-GB" dirty="0" smtClean="0">
+                <a:solidFill>
+                  <a:sysClr val="windowText" lastClr="000000"/>
+                </a:solidFill>
+              </a:rPr>
+              <a:t>3</a:t>
+            </a:r>
+            <a:endParaRPr lang="de-CH" dirty="0">
+              <a:solidFill>
+                <a:sysClr val="windowText" lastClr="000000"/>
+              </a:solidFill>
+            </a:endParaRPr>
+          </a:p>
+        </p:txBody>
+      </p:sp>
+      <p:sp>
+        <p:nvSpPr>
+          <p:cNvPr id="33" name="Oval 32"/>
+          <p:cNvSpPr/>
+          <p:nvPr/>
+        </p:nvSpPr>
+        <p:spPr>
+          <a:xfrm>
+            <a:off x="6033350" y="3267108"/>
+            <a:ext cx="203200" cy="203200"/>
+          </a:xfrm>
+          <a:prstGeom prst="ellipse">
+            <a:avLst/>
+          </a:prstGeom>
+          <a:solidFill>
+            <a:srgbClr val="FFC000"/>
+          </a:solidFill>
+        </p:spPr>
+        <p:style>
+          <a:lnRef idx="2">
+            <a:schemeClr val="accent1">
+              <a:shade val="50000"/>
+            </a:schemeClr>
+          </a:lnRef>
+          <a:fillRef idx="1">
+            <a:schemeClr val="accent1"/>
+          </a:fillRef>
+          <a:effectRef idx="0">
+            <a:schemeClr val="accent1"/>
+          </a:effectRef>
+          <a:fontRef idx="minor">
+            <a:schemeClr val="lt1"/>
+          </a:fontRef>
+        </p:style>
+        <p:txBody>
+          <a:bodyPr rtlCol="0" anchor="ctr"/>
+          <a:lstStyle/>
+          <a:p>
+            <a:pPr algn="ctr"/>
+            <a:r>
+              <a:rPr lang="en-GB" dirty="0" smtClean="0">
+                <a:solidFill>
+                  <a:sysClr val="windowText" lastClr="000000"/>
+                </a:solidFill>
+              </a:rPr>
+              <a:t>4</a:t>
+            </a:r>
+            <a:endParaRPr lang="de-CH" dirty="0">
+              <a:solidFill>
+                <a:sysClr val="windowText" lastClr="000000"/>
+              </a:solidFill>
+            </a:endParaRPr>
+          </a:p>
+        </p:txBody>
+      </p:sp>
+      <p:sp>
+        <p:nvSpPr>
+          <p:cNvPr id="35" name="Oval 34"/>
+          <p:cNvSpPr/>
+          <p:nvPr/>
+        </p:nvSpPr>
+        <p:spPr>
+          <a:xfrm>
+            <a:off x="9238849" y="4021101"/>
+            <a:ext cx="203200" cy="203200"/>
+          </a:xfrm>
+          <a:prstGeom prst="ellipse">
+            <a:avLst/>
+          </a:prstGeom>
+          <a:solidFill>
+            <a:srgbClr val="FFC000"/>
+          </a:solidFill>
+        </p:spPr>
+        <p:style>
+          <a:lnRef idx="2">
+            <a:schemeClr val="accent1">
+              <a:shade val="50000"/>
+            </a:schemeClr>
+          </a:lnRef>
+          <a:fillRef idx="1">
+            <a:schemeClr val="accent1"/>
+          </a:fillRef>
+          <a:effectRef idx="0">
+            <a:schemeClr val="accent1"/>
+          </a:effectRef>
+          <a:fontRef idx="minor">
+            <a:schemeClr val="lt1"/>
+          </a:fontRef>
+        </p:style>
+        <p:txBody>
+          <a:bodyPr rtlCol="0" anchor="ctr"/>
+          <a:lstStyle/>
+          <a:p>
+            <a:pPr algn="ctr"/>
+            <a:r>
+              <a:rPr lang="en-GB" dirty="0">
+                <a:solidFill>
+                  <a:sysClr val="windowText" lastClr="000000"/>
+                </a:solidFill>
+              </a:rPr>
+              <a:t>5</a:t>
+            </a:r>
+            <a:endParaRPr lang="de-CH" dirty="0">
+              <a:solidFill>
+                <a:sysClr val="windowText" lastClr="000000"/>
+              </a:solidFill>
+            </a:endParaRPr>
+          </a:p>
+        </p:txBody>
+      </p:sp>
+      <p:sp>
+        <p:nvSpPr>
+          <p:cNvPr id="36" name="Oval 35"/>
+          <p:cNvSpPr/>
+          <p:nvPr/>
+        </p:nvSpPr>
+        <p:spPr>
+          <a:xfrm>
+            <a:off x="6081023" y="4207950"/>
+            <a:ext cx="203200" cy="203200"/>
+          </a:xfrm>
+          <a:prstGeom prst="ellipse">
+            <a:avLst/>
+          </a:prstGeom>
+          <a:solidFill>
+            <a:srgbClr val="FFC000"/>
+          </a:solidFill>
+        </p:spPr>
+        <p:style>
+          <a:lnRef idx="2">
+            <a:schemeClr val="accent1">
+              <a:shade val="50000"/>
+            </a:schemeClr>
+          </a:lnRef>
+          <a:fillRef idx="1">
+            <a:schemeClr val="accent1"/>
+          </a:fillRef>
+          <a:effectRef idx="0">
+            <a:schemeClr val="accent1"/>
+          </a:effectRef>
+          <a:fontRef idx="minor">
+            <a:schemeClr val="lt1"/>
+          </a:fontRef>
+        </p:style>
+        <p:txBody>
+          <a:bodyPr rtlCol="0" anchor="ctr"/>
+          <a:lstStyle/>
+          <a:p>
+            <a:pPr algn="ctr"/>
+            <a:r>
+              <a:rPr lang="en-GB" dirty="0">
+                <a:solidFill>
+                  <a:sysClr val="windowText" lastClr="000000"/>
+                </a:solidFill>
+              </a:rPr>
+              <a:t>6</a:t>
+            </a:r>
+            <a:endParaRPr lang="de-CH" dirty="0">
+              <a:solidFill>
+                <a:sysClr val="windowText" lastClr="000000"/>
+              </a:solidFill>
+            </a:endParaRPr>
+          </a:p>
+        </p:txBody>
+      </p:sp>
+      <p:sp>
+        <p:nvSpPr>
+          <p:cNvPr id="38" name="Oval 37"/>
+          <p:cNvSpPr/>
+          <p:nvPr/>
+        </p:nvSpPr>
+        <p:spPr>
+          <a:xfrm>
+            <a:off x="6033350" y="5077150"/>
+            <a:ext cx="203200" cy="203200"/>
+          </a:xfrm>
+          <a:prstGeom prst="ellipse">
+            <a:avLst/>
+          </a:prstGeom>
+          <a:solidFill>
+            <a:srgbClr val="FFC000"/>
+          </a:solidFill>
+        </p:spPr>
+        <p:style>
+          <a:lnRef idx="2">
+            <a:schemeClr val="accent1">
+              <a:shade val="50000"/>
+            </a:schemeClr>
+          </a:lnRef>
+          <a:fillRef idx="1">
+            <a:schemeClr val="accent1"/>
+          </a:fillRef>
+          <a:effectRef idx="0">
+            <a:schemeClr val="accent1"/>
+          </a:effectRef>
+          <a:fontRef idx="minor">
+            <a:schemeClr val="lt1"/>
+          </a:fontRef>
+        </p:style>
+        <p:txBody>
+          <a:bodyPr rtlCol="0" anchor="ctr"/>
+          <a:lstStyle/>
+          <a:p>
+            <a:pPr algn="ctr"/>
+            <a:r>
+              <a:rPr lang="en-GB" dirty="0" smtClean="0">
+                <a:solidFill>
+                  <a:sysClr val="windowText" lastClr="000000"/>
+                </a:solidFill>
+              </a:rPr>
+              <a:t>7</a:t>
+            </a:r>
+            <a:endParaRPr lang="de-CH" dirty="0">
+              <a:solidFill>
+                <a:sysClr val="windowText" lastClr="000000"/>
+              </a:solidFill>
+            </a:endParaRPr>
+          </a:p>
+        </p:txBody>
+      </p:sp>
+      <p:sp>
+        <p:nvSpPr>
+          <p:cNvPr id="39" name="Oval 38"/>
+          <p:cNvSpPr/>
+          <p:nvPr/>
+        </p:nvSpPr>
+        <p:spPr>
+          <a:xfrm>
+            <a:off x="6033350" y="5438825"/>
+            <a:ext cx="203200" cy="203200"/>
+          </a:xfrm>
+          <a:prstGeom prst="ellipse">
+            <a:avLst/>
+          </a:prstGeom>
+          <a:solidFill>
+            <a:srgbClr val="FFC000"/>
+          </a:solidFill>
+        </p:spPr>
+        <p:style>
+          <a:lnRef idx="2">
+            <a:schemeClr val="accent1">
+              <a:shade val="50000"/>
+            </a:schemeClr>
+          </a:lnRef>
+          <a:fillRef idx="1">
+            <a:schemeClr val="accent1"/>
+          </a:fillRef>
+          <a:effectRef idx="0">
+            <a:schemeClr val="accent1"/>
+          </a:effectRef>
+          <a:fontRef idx="minor">
+            <a:schemeClr val="lt1"/>
+          </a:fontRef>
+        </p:style>
+        <p:txBody>
+          <a:bodyPr rtlCol="0" anchor="ctr"/>
+          <a:lstStyle/>
+          <a:p>
+            <a:pPr algn="ctr"/>
+            <a:r>
+              <a:rPr lang="en-GB" dirty="0">
+                <a:solidFill>
+                  <a:sysClr val="windowText" lastClr="000000"/>
+                </a:solidFill>
+              </a:rPr>
+              <a:t>8</a:t>
+            </a:r>
+            <a:endParaRPr lang="de-CH" dirty="0">
+              <a:solidFill>
+                <a:sysClr val="windowText" lastClr="000000"/>
+              </a:solidFill>
+            </a:endParaRPr>
+          </a:p>
+        </p:txBody>
+      </p:sp>
     </p:spTree>
     <p:extLst>
       <p:ext uri="{BB962C8B-B14F-4D97-AF65-F5344CB8AC3E}">

</xml_diff>